<commit_message>
3220 schedule/review slides update
</commit_message>
<xml_diff>
--- a/eece3220/lectures/eece.3220_lec37_exam3_preview.pptx
+++ b/eece3220/lectures/eece.3220_lec37_exam3_preview.pptx
@@ -204,7 +204,7 @@
   <pc:docChgLst>
     <pc:chgData name="Geiger, Michael J" userId="13cae92b-b37c-450b-a449-82fcae19569d" providerId="ADAL" clId="{36414090-B0F4-49FC-A9A8-6DF4DBCC3E07}"/>
     <pc:docChg chg="custSel addSld delSld modSld">
-      <pc:chgData name="Geiger, Michael J" userId="13cae92b-b37c-450b-a449-82fcae19569d" providerId="ADAL" clId="{36414090-B0F4-49FC-A9A8-6DF4DBCC3E07}" dt="2019-12-11T04:52:26.706" v="2278" actId="20577"/>
+      <pc:chgData name="Geiger, Michael J" userId="13cae92b-b37c-450b-a449-82fcae19569d" providerId="ADAL" clId="{36414090-B0F4-49FC-A9A8-6DF4DBCC3E07}" dt="2019-12-11T15:22:57.760" v="2290" actId="20577"/>
       <pc:docMkLst>
         <pc:docMk/>
       </pc:docMkLst>
@@ -381,13 +381,13 @@
         </pc:spChg>
       </pc:sldChg>
       <pc:sldChg chg="modSp">
-        <pc:chgData name="Geiger, Michael J" userId="13cae92b-b37c-450b-a449-82fcae19569d" providerId="ADAL" clId="{36414090-B0F4-49FC-A9A8-6DF4DBCC3E07}" dt="2019-12-11T04:47:26.214" v="1632" actId="20577"/>
+        <pc:chgData name="Geiger, Michael J" userId="13cae92b-b37c-450b-a449-82fcae19569d" providerId="ADAL" clId="{36414090-B0F4-49FC-A9A8-6DF4DBCC3E07}" dt="2019-12-11T15:22:57.760" v="2290" actId="20577"/>
         <pc:sldMkLst>
           <pc:docMk/>
           <pc:sldMk cId="1810248177" sldId="568"/>
         </pc:sldMkLst>
         <pc:spChg chg="mod">
-          <ac:chgData name="Geiger, Michael J" userId="13cae92b-b37c-450b-a449-82fcae19569d" providerId="ADAL" clId="{36414090-B0F4-49FC-A9A8-6DF4DBCC3E07}" dt="2019-12-11T04:47:26.214" v="1632" actId="20577"/>
+          <ac:chgData name="Geiger, Michael J" userId="13cae92b-b37c-450b-a449-82fcae19569d" providerId="ADAL" clId="{36414090-B0F4-49FC-A9A8-6DF4DBCC3E07}" dt="2019-12-11T15:22:57.760" v="2290" actId="20577"/>
           <ac:spMkLst>
             <pc:docMk/>
             <pc:sldMk cId="1810248177" sldId="568"/>
@@ -1421,7 +1421,7 @@
               </a14:hiddenFill>
             </a:ext>
             <a:ext uri="{FAA26D3D-D897-4be2-8F04-BA451C77F1D7}">
-              <ma14:placeholderFlag xmlns:ma14="http://schemas.microsoft.com/office/mac/drawingml/2011/main" xmlns="" val="1"/>
+              <ma14:placeholderFlag xmlns="" xmlns:ma14="http://schemas.microsoft.com/office/mac/drawingml/2011/main" val="1"/>
             </a:ext>
           </a:extLst>
         </p:spPr>
@@ -1953,7 +1953,7 @@
               </a14:hiddenLine>
             </a:ext>
             <a:ext uri="{FAA26D3D-D897-4be2-8F04-BA451C77F1D7}">
-              <ma14:placeholderFlag xmlns:ma14="http://schemas.microsoft.com/office/mac/drawingml/2011/main" xmlns="" val="1"/>
+              <ma14:placeholderFlag xmlns="" xmlns:ma14="http://schemas.microsoft.com/office/mac/drawingml/2011/main" val="1"/>
             </a:ext>
           </a:extLst>
         </p:spPr>
@@ -2198,7 +2198,7 @@
           <a:p>
             <a:fld id="{0BD5FB99-959E-467B-AABE-E969FF165B35}" type="datetime1">
               <a:rPr lang="en-US" smtClean="0"/>
-              <a:t>12/10/2019</a:t>
+              <a:t>12/11/2019</a:t>
             </a:fld>
             <a:endParaRPr lang="en-US"/>
           </a:p>
@@ -2392,7 +2392,7 @@
           <a:p>
             <a:fld id="{FEEF785E-9B87-47DC-8EF0-B1D8124ED8A9}" type="datetime1">
               <a:rPr lang="en-US" smtClean="0"/>
-              <a:t>12/10/2019</a:t>
+              <a:t>12/11/2019</a:t>
             </a:fld>
             <a:endParaRPr lang="en-US"/>
           </a:p>
@@ -2595,7 +2595,7 @@
           <a:p>
             <a:fld id="{8CB9532D-CEDE-40CF-92F7-F7F3A2D5D3B8}" type="datetime1">
               <a:rPr lang="en-US" smtClean="0"/>
-              <a:t>12/10/2019</a:t>
+              <a:t>12/11/2019</a:t>
             </a:fld>
             <a:endParaRPr lang="en-US"/>
           </a:p>
@@ -2854,7 +2854,7 @@
           <a:p>
             <a:fld id="{4E69B420-56B8-48F3-89BA-D657A9D206AD}" type="datetime1">
               <a:rPr lang="en-US" smtClean="0"/>
-              <a:t>12/10/2019</a:t>
+              <a:t>12/11/2019</a:t>
             </a:fld>
             <a:endParaRPr lang="en-US"/>
           </a:p>
@@ -3113,7 +3113,7 @@
           <a:p>
             <a:fld id="{5A392183-F897-4F54-B5B0-DC7681203114}" type="datetime1">
               <a:rPr lang="en-US" smtClean="0"/>
-              <a:t>12/10/2019</a:t>
+              <a:t>12/11/2019</a:t>
             </a:fld>
             <a:endParaRPr lang="en-US"/>
           </a:p>
@@ -3306,7 +3306,7 @@
           <a:p>
             <a:fld id="{06A93B06-F8EC-4A90-8E90-7E2AFDFAABE2}" type="datetime1">
               <a:rPr lang="en-US" smtClean="0"/>
-              <a:t>12/10/2019</a:t>
+              <a:t>12/11/2019</a:t>
             </a:fld>
             <a:endParaRPr lang="en-US"/>
           </a:p>
@@ -3522,7 +3522,7 @@
           <a:p>
             <a:fld id="{D5DFC9B1-B7D0-481A-B08E-B25016FD0176}" type="datetime1">
               <a:rPr lang="en-US" smtClean="0"/>
-              <a:t>12/10/2019</a:t>
+              <a:t>12/11/2019</a:t>
             </a:fld>
             <a:endParaRPr lang="en-US"/>
           </a:p>
@@ -3832,7 +3832,7 @@
           <a:p>
             <a:fld id="{902D2E1A-4303-4D18-92D6-B4D4BF54B383}" type="datetime1">
               <a:rPr lang="en-US" smtClean="0"/>
-              <a:t>12/10/2019</a:t>
+              <a:t>12/11/2019</a:t>
             </a:fld>
             <a:endParaRPr lang="en-US"/>
           </a:p>
@@ -4281,7 +4281,7 @@
           <a:p>
             <a:fld id="{188C5601-698F-4910-AF25-791FA62154D1}" type="datetime1">
               <a:rPr lang="en-US" smtClean="0"/>
-              <a:t>12/10/2019</a:t>
+              <a:t>12/11/2019</a:t>
             </a:fld>
             <a:endParaRPr lang="en-US"/>
           </a:p>
@@ -4423,7 +4423,7 @@
           <a:p>
             <a:fld id="{F4762ADC-FF26-46C1-A798-B9A548A08D97}" type="datetime1">
               <a:rPr lang="en-US" smtClean="0"/>
-              <a:t>12/10/2019</a:t>
+              <a:t>12/11/2019</a:t>
             </a:fld>
             <a:endParaRPr lang="en-US"/>
           </a:p>
@@ -4543,7 +4543,7 @@
           <a:p>
             <a:fld id="{281FC796-F7F7-47C5-AADC-CE559E0D7FB3}" type="datetime1">
               <a:rPr lang="en-US" smtClean="0"/>
-              <a:t>12/10/2019</a:t>
+              <a:t>12/11/2019</a:t>
             </a:fld>
             <a:endParaRPr lang="en-US"/>
           </a:p>
@@ -4843,7 +4843,7 @@
           <a:p>
             <a:fld id="{338873DE-BCE0-4B79-A8F7-FC6EF7622A9C}" type="datetime1">
               <a:rPr lang="en-US" smtClean="0"/>
-              <a:t>12/10/2019</a:t>
+              <a:t>12/11/2019</a:t>
             </a:fld>
             <a:endParaRPr lang="en-US"/>
           </a:p>
@@ -5121,7 +5121,7 @@
           <a:p>
             <a:fld id="{9C915FFF-00E0-4C22-8067-FF7374C8F496}" type="datetime1">
               <a:rPr lang="en-US" smtClean="0"/>
-              <a:t>12/10/2019</a:t>
+              <a:t>12/11/2019</a:t>
             </a:fld>
             <a:endParaRPr lang="en-US"/>
           </a:p>
@@ -5267,7 +5267,7 @@
               </a14:hiddenLine>
             </a:ext>
             <a:ext uri="{FAA26D3D-D897-4be2-8F04-BA451C77F1D7}">
-              <ma14:placeholderFlag xmlns:ma14="http://schemas.microsoft.com/office/mac/drawingml/2011/main" xmlns="" val="1"/>
+              <ma14:placeholderFlag xmlns="" xmlns:ma14="http://schemas.microsoft.com/office/mac/drawingml/2011/main" val="1"/>
             </a:ext>
           </a:extLst>
         </p:spPr>
@@ -5328,7 +5328,7 @@
               </a14:hiddenLine>
             </a:ext>
             <a:ext uri="{FAA26D3D-D897-4be2-8F04-BA451C77F1D7}">
-              <ma14:placeholderFlag xmlns:ma14="http://schemas.microsoft.com/office/mac/drawingml/2011/main" xmlns="" val="1"/>
+              <ma14:placeholderFlag xmlns="" xmlns:ma14="http://schemas.microsoft.com/office/mac/drawingml/2011/main" val="1"/>
             </a:ext>
           </a:extLst>
         </p:spPr>
@@ -5419,7 +5419,7 @@
           <a:p>
             <a:fld id="{8F1378C9-9913-4376-9AFD-1ED4789E4028}" type="datetime1">
               <a:rPr lang="en-US" smtClean="0"/>
-              <a:t>12/10/2019</a:t>
+              <a:t>12/11/2019</a:t>
             </a:fld>
             <a:endParaRPr lang="en-US"/>
           </a:p>
@@ -6400,7 +6400,7 @@
           <a:p>
             <a:fld id="{3625B6D5-655F-4CFA-B0F7-90097EACFC1E}" type="datetime1">
               <a:rPr lang="en-US" smtClean="0"/>
-              <a:t>12/10/2019</a:t>
+              <a:t>12/11/2019</a:t>
             </a:fld>
             <a:endParaRPr lang="en-US"/>
           </a:p>
@@ -6583,7 +6583,7 @@
           <a:p>
             <a:fld id="{B1E629E7-3FED-48B3-93BA-9802D9ED57EF}" type="datetime1">
               <a:rPr lang="en-US" smtClean="0"/>
-              <a:t>12/10/2019</a:t>
+              <a:t>12/11/2019</a:t>
             </a:fld>
             <a:endParaRPr lang="en-US"/>
           </a:p>
@@ -6801,7 +6801,7 @@
           <a:p>
             <a:fld id="{A0D8C26C-F555-4B86-881D-147ED7A2793A}" type="datetime1">
               <a:rPr lang="en-US" smtClean="0"/>
-              <a:t>12/10/2019</a:t>
+              <a:t>12/11/2019</a:t>
             </a:fld>
             <a:endParaRPr lang="en-US"/>
           </a:p>
@@ -7065,22 +7065,27 @@
             <a:pPr lvl="1"/>
             <a:r>
               <a:rPr lang="en-US" dirty="0"/>
-              <a:t>If first element @ index 1, then, given index n</a:t>
+              <a:t>If first element @ index 0, then, given index n</a:t>
             </a:r>
           </a:p>
           <a:p>
             <a:pPr lvl="2"/>
             <a:r>
               <a:rPr lang="en-US" dirty="0"/>
-              <a:t>Children are at indexes 2*n and 2*n + 1</a:t>
+              <a:t>Children are at indexes 2*n + 1 and 2*n + 2</a:t>
             </a:r>
           </a:p>
           <a:p>
             <a:pPr lvl="2"/>
             <a:r>
               <a:rPr lang="en-US" dirty="0"/>
-              <a:t>Parent is at index n/2</a:t>
-            </a:r>
+              <a:t>Parent is at </a:t>
+            </a:r>
+            <a:r>
+              <a:rPr lang="en-US"/>
+              <a:t>index (n-1)/2</a:t>
+            </a:r>
+            <a:endParaRPr lang="en-US" dirty="0"/>
           </a:p>
           <a:p>
             <a:r>
@@ -7126,7 +7131,7 @@
           <a:p>
             <a:fld id="{89E6235D-6CB9-4858-94CA-EF8A73D574D7}" type="datetime1">
               <a:rPr lang="en-US" smtClean="0"/>
-              <a:t>12/10/2019</a:t>
+              <a:t>12/11/2019</a:t>
             </a:fld>
             <a:endParaRPr lang="en-US"/>
           </a:p>
@@ -7322,7 +7327,7 @@
           <a:p>
             <a:fld id="{07D1383F-B37F-4A78-8260-24C8B4CEF42C}" type="datetime1">
               <a:rPr lang="en-US" smtClean="0"/>
-              <a:t>12/10/2019</a:t>
+              <a:t>12/11/2019</a:t>
             </a:fld>
             <a:endParaRPr lang="en-US"/>
           </a:p>
@@ -7535,7 +7540,7 @@
           <a:p>
             <a:fld id="{054FBC0E-DDC6-445E-A0E9-562AF7E5AFCF}" type="datetime1">
               <a:rPr lang="en-US" smtClean="0"/>
-              <a:t>12/10/2019</a:t>
+              <a:t>12/11/2019</a:t>
             </a:fld>
             <a:endParaRPr lang="en-US"/>
           </a:p>
@@ -7826,7 +7831,7 @@
           <a:p>
             <a:fld id="{923F9E20-C15C-4633-BAC6-20E36B96342C}" type="datetime1">
               <a:rPr lang="en-US" smtClean="0"/>
-              <a:t>12/10/2019</a:t>
+              <a:t>12/11/2019</a:t>
             </a:fld>
             <a:endParaRPr lang="en-US"/>
           </a:p>
@@ -8071,7 +8076,7 @@
           <a:p>
             <a:fld id="{AF2DB5E8-A617-4EB1-8C8C-928BD20DAB84}" type="datetime1">
               <a:rPr lang="en-US" smtClean="0"/>
-              <a:t>12/10/2019</a:t>
+              <a:t>12/11/2019</a:t>
             </a:fld>
             <a:endParaRPr lang="en-US"/>
           </a:p>
@@ -8241,7 +8246,7 @@
           <a:p>
             <a:fld id="{DCAA3445-80BA-4694-A640-0ED484F3225E}" type="datetime1">
               <a:rPr lang="en-US" smtClean="0"/>
-              <a:t>12/10/2019</a:t>
+              <a:t>12/11/2019</a:t>
             </a:fld>
             <a:endParaRPr lang="en-US"/>
           </a:p>
@@ -8611,7 +8616,7 @@
           <a:p>
             <a:fld id="{6BECCADA-9205-47FD-AACB-D63D066519AF}" type="datetime1">
               <a:rPr lang="en-US" smtClean="0"/>
-              <a:t>12/10/2019</a:t>
+              <a:t>12/11/2019</a:t>
             </a:fld>
             <a:endParaRPr lang="en-US"/>
           </a:p>
@@ -9053,7 +9058,7 @@
           <a:p>
             <a:fld id="{69025B39-E651-4941-BB1A-1D73919C9BCA}" type="datetime1">
               <a:rPr lang="en-US" smtClean="0"/>
-              <a:t>12/10/2019</a:t>
+              <a:t>12/11/2019</a:t>
             </a:fld>
             <a:endParaRPr lang="en-US" dirty="0"/>
           </a:p>
@@ -9331,7 +9336,7 @@
           <a:p>
             <a:fld id="{5AA5699D-DB06-46E2-B4C8-4DA19CCB86E1}" type="datetime1">
               <a:rPr lang="en-US" smtClean="0"/>
-              <a:t>12/10/2019</a:t>
+              <a:t>12/11/2019</a:t>
             </a:fld>
             <a:endParaRPr lang="en-US"/>
           </a:p>
@@ -9759,7 +9764,7 @@
               <a:rPr lang="en-US" smtClean="0">
                 <a:latin typeface="Garamond" charset="0"/>
               </a:rPr>
-              <a:t>12/10/2019</a:t>
+              <a:t>12/11/2019</a:t>
             </a:fld>
             <a:endParaRPr lang="en-US">
               <a:latin typeface="Garamond" charset="0"/>
@@ -10101,7 +10106,7 @@
           <a:p>
             <a:fld id="{8DC35575-C46B-4BEC-BD3F-8AD62506B2EA}" type="datetime1">
               <a:rPr lang="en-US" smtClean="0"/>
-              <a:t>12/10/2019</a:t>
+              <a:t>12/11/2019</a:t>
             </a:fld>
             <a:endParaRPr lang="en-US"/>
           </a:p>
@@ -10312,7 +10317,7 @@
           <a:p>
             <a:fld id="{925873E2-7F59-419E-9305-C26A112B2D7D}" type="datetime1">
               <a:rPr lang="en-US" smtClean="0"/>
-              <a:t>12/10/2019</a:t>
+              <a:t>12/11/2019</a:t>
             </a:fld>
             <a:endParaRPr lang="en-US"/>
           </a:p>
@@ -10559,7 +10564,7 @@
           <a:p>
             <a:fld id="{C3BC1D1B-AFB9-41EC-8D27-61F4781DD987}" type="datetime1">
               <a:rPr lang="en-US" smtClean="0"/>
-              <a:t>12/10/2019</a:t>
+              <a:t>12/11/2019</a:t>
             </a:fld>
             <a:endParaRPr lang="en-US"/>
           </a:p>
@@ -10774,7 +10779,7 @@
           <a:p>
             <a:fld id="{B9AB62B8-6AE0-4123-A209-6484CFD16538}" type="datetime1">
               <a:rPr lang="en-US" smtClean="0"/>
-              <a:t>12/10/2019</a:t>
+              <a:t>12/11/2019</a:t>
             </a:fld>
             <a:endParaRPr lang="en-US"/>
           </a:p>
@@ -11025,7 +11030,7 @@
           <a:p>
             <a:fld id="{B204E30D-981B-4A90-AADD-0F893ED8CDBC}" type="datetime1">
               <a:rPr lang="en-US" smtClean="0"/>
-              <a:t>12/10/2019</a:t>
+              <a:t>12/11/2019</a:t>
             </a:fld>
             <a:endParaRPr lang="en-US"/>
           </a:p>

</xml_diff>